<commit_message>
Added config file section
git-svn-id: http://dminfo:8686/svn/repository/models/branches/dsm2_distribute_v8_0@1529 cdc4813b-4270-ec4f-936e-925f93a782c2

Former-commit-id: dcf2ba8d142b1a4d291f2e498cdf00d09b5e6d9c
</commit_message>
<xml_diff>
--- a/dsm2/presentations/p3b_input.pptx
+++ b/dsm2/presentations/p3b_input.pptx
@@ -5,10 +5,10 @@
     <p:sldMasterId id="2147483648" r:id="rId1"/>
   </p:sldMasterIdLst>
   <p:notesMasterIdLst>
-    <p:notesMasterId r:id="rId14"/>
+    <p:notesMasterId r:id="rId15"/>
   </p:notesMasterIdLst>
   <p:handoutMasterIdLst>
-    <p:handoutMasterId r:id="rId15"/>
+    <p:handoutMasterId r:id="rId16"/>
   </p:handoutMasterIdLst>
   <p:sldIdLst>
     <p:sldId id="429" r:id="rId2"/>
@@ -18,11 +18,12 @@
     <p:sldId id="430" r:id="rId6"/>
     <p:sldId id="432" r:id="rId7"/>
     <p:sldId id="433" r:id="rId8"/>
-    <p:sldId id="439" r:id="rId9"/>
-    <p:sldId id="440" r:id="rId10"/>
-    <p:sldId id="441" r:id="rId11"/>
-    <p:sldId id="437" r:id="rId12"/>
-    <p:sldId id="444" r:id="rId13"/>
+    <p:sldId id="446" r:id="rId9"/>
+    <p:sldId id="439" r:id="rId10"/>
+    <p:sldId id="445" r:id="rId11"/>
+    <p:sldId id="440" r:id="rId12"/>
+    <p:sldId id="441" r:id="rId13"/>
+    <p:sldId id="437" r:id="rId14"/>
   </p:sldIdLst>
   <p:sldSz cx="9144000" cy="6858000" type="screen4x3"/>
   <p:notesSz cx="7010400" cy="9296400"/>
@@ -4373,6 +4374,1337 @@
       </p:grpSpPr>
       <p:sp>
         <p:nvSpPr>
+          <p:cNvPr id="5" name="Title 4"/>
+          <p:cNvSpPr>
+            <a:spLocks noGrp="1"/>
+          </p:cNvSpPr>
+          <p:nvPr>
+            <p:ph type="title"/>
+          </p:nvPr>
+        </p:nvSpPr>
+        <p:spPr>
+          <a:xfrm>
+            <a:off x="685800" y="52635"/>
+            <a:ext cx="7772400" cy="1143000"/>
+          </a:xfrm>
+        </p:spPr>
+        <p:txBody>
+          <a:bodyPr/>
+          <a:lstStyle/>
+          <a:p>
+            <a:r>
+              <a:rPr lang="en-US" dirty="0" smtClean="0"/>
+              <a:t>Configuration Files</a:t>
+            </a:r>
+            <a:endParaRPr lang="en-US" dirty="0"/>
+          </a:p>
+        </p:txBody>
+      </p:sp>
+      <p:sp>
+        <p:nvSpPr>
+          <p:cNvPr id="34" name="Content Placeholder 33"/>
+          <p:cNvSpPr>
+            <a:spLocks noGrp="1"/>
+          </p:cNvSpPr>
+          <p:nvPr>
+            <p:ph idx="1"/>
+          </p:nvPr>
+        </p:nvSpPr>
+        <p:spPr>
+          <a:xfrm>
+            <a:off x="670302" y="950574"/>
+            <a:ext cx="7772400" cy="4114800"/>
+          </a:xfrm>
+        </p:spPr>
+        <p:txBody>
+          <a:bodyPr/>
+          <a:lstStyle/>
+          <a:p>
+            <a:r>
+              <a:rPr lang="en-US" dirty="0" smtClean="0"/>
+              <a:t>Really just an ENVVAR section</a:t>
+            </a:r>
+          </a:p>
+          <a:p>
+            <a:r>
+              <a:rPr lang="en-US" dirty="0" smtClean="0"/>
+              <a:t>Contains study/ cross-module data</a:t>
+            </a:r>
+          </a:p>
+          <a:p>
+            <a:r>
+              <a:rPr lang="en-US" dirty="0" smtClean="0"/>
+              <a:t>Production templates all have them!</a:t>
+            </a:r>
+          </a:p>
+        </p:txBody>
+      </p:sp>
+      <p:sp>
+        <p:nvSpPr>
+          <p:cNvPr id="4" name="Date Placeholder 3"/>
+          <p:cNvSpPr>
+            <a:spLocks noGrp="1"/>
+          </p:cNvSpPr>
+          <p:nvPr>
+            <p:ph type="dt" sz="half" idx="10"/>
+          </p:nvPr>
+        </p:nvSpPr>
+        <p:spPr/>
+        <p:txBody>
+          <a:bodyPr/>
+          <a:lstStyle/>
+          <a:p>
+            <a:pPr>
+              <a:defRPr/>
+            </a:pPr>
+            <a:fld id="{8F2E2A8A-7779-4380-895C-98F53310B698}" type="slidenum">
+              <a:rPr lang="en-US" smtClean="0"/>
+              <a:pPr>
+                <a:defRPr/>
+              </a:pPr>
+              <a:t>10</a:t>
+            </a:fld>
+            <a:endParaRPr lang="en-US"/>
+          </a:p>
+        </p:txBody>
+      </p:sp>
+      <p:sp>
+        <p:nvSpPr>
+          <p:cNvPr id="28" name="Title 4"/>
+          <p:cNvSpPr txBox="1">
+            <a:spLocks/>
+          </p:cNvSpPr>
+          <p:nvPr/>
+        </p:nvSpPr>
+        <p:spPr bwMode="auto">
+          <a:xfrm>
+            <a:off x="623806" y="486582"/>
+            <a:ext cx="7772400" cy="1143000"/>
+          </a:xfrm>
+          <a:prstGeom prst="rect">
+            <a:avLst/>
+          </a:prstGeom>
+          <a:noFill/>
+          <a:ln w="9525">
+            <a:noFill/>
+            <a:miter lim="800000"/>
+            <a:headEnd/>
+            <a:tailEnd/>
+          </a:ln>
+        </p:spPr>
+        <p:txBody>
+          <a:bodyPr vert="horz" wrap="square" lIns="91440" tIns="45720" rIns="91440" bIns="45720" numCol="1" anchor="ctr" anchorCtr="0" compatLnSpc="1">
+            <a:prstTxWarp prst="textNoShape">
+              <a:avLst/>
+            </a:prstTxWarp>
+          </a:bodyPr>
+          <a:lstStyle/>
+          <a:p>
+            <a:pPr marL="0" marR="0" lvl="0" indent="0" algn="ctr" defTabSz="914400" rtl="0" eaLnBrk="0" fontAlgn="base" latinLnBrk="0" hangingPunct="0">
+              <a:lnSpc>
+                <a:spcPct val="100000"/>
+              </a:lnSpc>
+              <a:spcBef>
+                <a:spcPct val="0"/>
+              </a:spcBef>
+              <a:spcAft>
+                <a:spcPct val="0"/>
+              </a:spcAft>
+              <a:buClrTx/>
+              <a:buSzTx/>
+              <a:buFontTx/>
+              <a:buNone/>
+              <a:tabLst/>
+              <a:defRPr/>
+            </a:pPr>
+            <a:endParaRPr kumimoji="0" lang="en-US" sz="4400" b="1" i="0" u="none" strike="noStrike" kern="0" cap="none" spc="0" normalizeH="0" baseline="0" noProof="0" dirty="0">
+              <a:ln>
+                <a:noFill/>
+              </a:ln>
+              <a:solidFill>
+                <a:schemeClr val="tx2"/>
+              </a:solidFill>
+              <a:effectLst/>
+              <a:uLnTx/>
+              <a:uFillTx/>
+              <a:latin typeface="+mj-lt"/>
+              <a:ea typeface="+mj-ea"/>
+              <a:cs typeface="+mj-cs"/>
+            </a:endParaRPr>
+          </a:p>
+        </p:txBody>
+      </p:sp>
+      <p:grpSp>
+        <p:nvGrpSpPr>
+          <p:cNvPr id="33" name="Group 32"/>
+          <p:cNvGrpSpPr/>
+          <p:nvPr/>
+        </p:nvGrpSpPr>
+        <p:grpSpPr>
+          <a:xfrm>
+            <a:off x="209228" y="2665702"/>
+            <a:ext cx="8694549" cy="4027747"/>
+            <a:chOff x="216976" y="1845131"/>
+            <a:chExt cx="8733295" cy="4174155"/>
+          </a:xfrm>
+        </p:grpSpPr>
+        <p:grpSp>
+          <p:nvGrpSpPr>
+            <p:cNvPr id="30" name="Group 29"/>
+            <p:cNvGrpSpPr/>
+            <p:nvPr/>
+          </p:nvGrpSpPr>
+          <p:grpSpPr>
+            <a:xfrm>
+              <a:off x="216976" y="1845131"/>
+              <a:ext cx="8733295" cy="4174155"/>
+              <a:chOff x="216976" y="1542920"/>
+              <a:chExt cx="8733295" cy="4174155"/>
+            </a:xfrm>
+          </p:grpSpPr>
+          <p:sp>
+            <p:nvSpPr>
+              <p:cNvPr id="16" name="Text Box 19"/>
+              <p:cNvSpPr txBox="1">
+                <a:spLocks noChangeArrowheads="1"/>
+              </p:cNvSpPr>
+              <p:nvPr/>
+            </p:nvSpPr>
+            <p:spPr bwMode="auto">
+              <a:xfrm>
+                <a:off x="6956148" y="2095613"/>
+                <a:ext cx="1467172" cy="369332"/>
+              </a:xfrm>
+              <a:prstGeom prst="rect">
+                <a:avLst/>
+              </a:prstGeom>
+              <a:noFill/>
+              <a:ln w="9525">
+                <a:noFill/>
+                <a:miter lim="800000"/>
+                <a:headEnd/>
+                <a:tailEnd/>
+              </a:ln>
+            </p:spPr>
+            <p:txBody>
+              <a:bodyPr wrap="square">
+                <a:spAutoFit/>
+              </a:bodyPr>
+              <a:lstStyle/>
+              <a:p>
+                <a:pPr algn="ctr">
+                  <a:spcBef>
+                    <a:spcPct val="50000"/>
+                  </a:spcBef>
+                </a:pPr>
+                <a:r>
+                  <a:rPr lang="en-US" sz="1800" dirty="0" smtClean="0">
+                    <a:solidFill>
+                      <a:schemeClr val="bg2"/>
+                    </a:solidFill>
+                  </a:rPr>
+                  <a:t>&lt;ptm</a:t>
+                </a:r>
+                <a:r>
+                  <a:rPr lang="en-US" sz="1800" dirty="0" smtClean="0">
+                    <a:solidFill>
+                      <a:schemeClr val="bg2"/>
+                    </a:solidFill>
+                  </a:rPr>
+                  <a:t>.inp&gt;</a:t>
+                </a:r>
+                <a:endParaRPr lang="en-US" sz="1800" dirty="0">
+                  <a:solidFill>
+                    <a:schemeClr val="bg2"/>
+                  </a:solidFill>
+                </a:endParaRPr>
+              </a:p>
+            </p:txBody>
+          </p:sp>
+          <p:grpSp>
+            <p:nvGrpSpPr>
+              <p:cNvPr id="19" name="Group 23"/>
+              <p:cNvGrpSpPr>
+                <a:grpSpLocks/>
+              </p:cNvGrpSpPr>
+              <p:nvPr/>
+            </p:nvGrpSpPr>
+            <p:grpSpPr bwMode="auto">
+              <a:xfrm>
+                <a:off x="216976" y="1542920"/>
+                <a:ext cx="8733295" cy="4174155"/>
+                <a:chOff x="613" y="2457"/>
+                <a:chExt cx="4590" cy="1784"/>
+              </a:xfrm>
+            </p:grpSpPr>
+            <p:sp>
+              <p:nvSpPr>
+                <p:cNvPr id="20" name="Rectangle 16"/>
+                <p:cNvSpPr>
+                  <a:spLocks noChangeArrowheads="1"/>
+                </p:cNvSpPr>
+                <p:nvPr/>
+              </p:nvSpPr>
+              <p:spPr bwMode="auto">
+                <a:xfrm>
+                  <a:off x="613" y="2457"/>
+                  <a:ext cx="4590" cy="1784"/>
+                </a:xfrm>
+                <a:prstGeom prst="rect">
+                  <a:avLst/>
+                </a:prstGeom>
+                <a:solidFill>
+                  <a:srgbClr val="339966"/>
+                </a:solidFill>
+                <a:ln w="9525">
+                  <a:solidFill>
+                    <a:schemeClr val="tx1"/>
+                  </a:solidFill>
+                  <a:miter lim="800000"/>
+                  <a:headEnd/>
+                  <a:tailEnd/>
+                </a:ln>
+              </p:spPr>
+              <p:txBody>
+                <a:bodyPr wrap="none" anchor="ctr"/>
+                <a:lstStyle/>
+                <a:p>
+                  <a:endParaRPr lang="en-US"/>
+                </a:p>
+              </p:txBody>
+            </p:sp>
+            <p:sp>
+              <p:nvSpPr>
+                <p:cNvPr id="21" name="Documents"/>
+                <p:cNvSpPr>
+                  <a:spLocks noEditPoints="1" noChangeArrowheads="1"/>
+                </p:cNvSpPr>
+                <p:nvPr/>
+              </p:nvSpPr>
+              <p:spPr bwMode="auto">
+                <a:xfrm>
+                  <a:off x="3128" y="2546"/>
+                  <a:ext cx="1716" cy="1627"/>
+                </a:xfrm>
+                <a:custGeom>
+                  <a:avLst/>
+                  <a:gdLst>
+                    <a:gd name="T0" fmla="*/ 0 w 21600"/>
+                    <a:gd name="T1" fmla="*/ 2800 h 21600"/>
+                    <a:gd name="T2" fmla="*/ 3468 w 21600"/>
+                    <a:gd name="T3" fmla="*/ 0 h 21600"/>
+                    <a:gd name="T4" fmla="*/ 21653 w 21600"/>
+                    <a:gd name="T5" fmla="*/ 18828 h 21600"/>
+                    <a:gd name="T6" fmla="*/ 19954 w 21600"/>
+                    <a:gd name="T7" fmla="*/ 20214 h 21600"/>
+                    <a:gd name="T8" fmla="*/ 18256 w 21600"/>
+                    <a:gd name="T9" fmla="*/ 21628 h 21600"/>
+                    <a:gd name="T10" fmla="*/ 19954 w 21600"/>
+                    <a:gd name="T11" fmla="*/ 1428 h 21600"/>
+                    <a:gd name="T12" fmla="*/ 18256 w 21600"/>
+                    <a:gd name="T13" fmla="*/ 2800 h 21600"/>
+                    <a:gd name="T14" fmla="*/ 1645 w 21600"/>
+                    <a:gd name="T15" fmla="*/ 1428 h 21600"/>
+                    <a:gd name="T16" fmla="*/ 21600 w 21600"/>
+                    <a:gd name="T17" fmla="*/ 0 h 21600"/>
+                    <a:gd name="T18" fmla="*/ 10800 w 21600"/>
+                    <a:gd name="T19" fmla="*/ 0 h 21600"/>
+                    <a:gd name="T20" fmla="*/ 0 w 21600"/>
+                    <a:gd name="T21" fmla="*/ 10800 h 21600"/>
+                    <a:gd name="T22" fmla="*/ 21600 w 21600"/>
+                    <a:gd name="T23" fmla="*/ 10800 h 21600"/>
+                    <a:gd name="T24" fmla="*/ 1645 w 21600"/>
+                    <a:gd name="T25" fmla="*/ 4171 h 21600"/>
+                    <a:gd name="T26" fmla="*/ 16522 w 21600"/>
+                    <a:gd name="T27" fmla="*/ 17314 h 21600"/>
+                  </a:gdLst>
+                  <a:ahLst/>
+                  <a:cxnLst>
+                    <a:cxn ang="0">
+                      <a:pos x="T0" y="T1"/>
+                    </a:cxn>
+                    <a:cxn ang="0">
+                      <a:pos x="T2" y="T3"/>
+                    </a:cxn>
+                    <a:cxn ang="0">
+                      <a:pos x="T4" y="T5"/>
+                    </a:cxn>
+                    <a:cxn ang="0">
+                      <a:pos x="T6" y="T7"/>
+                    </a:cxn>
+                    <a:cxn ang="0">
+                      <a:pos x="T8" y="T9"/>
+                    </a:cxn>
+                    <a:cxn ang="0">
+                      <a:pos x="T10" y="T11"/>
+                    </a:cxn>
+                    <a:cxn ang="0">
+                      <a:pos x="T12" y="T13"/>
+                    </a:cxn>
+                    <a:cxn ang="0">
+                      <a:pos x="T14" y="T15"/>
+                    </a:cxn>
+                    <a:cxn ang="0">
+                      <a:pos x="T16" y="T17"/>
+                    </a:cxn>
+                    <a:cxn ang="0">
+                      <a:pos x="T18" y="T19"/>
+                    </a:cxn>
+                    <a:cxn ang="0">
+                      <a:pos x="T20" y="T21"/>
+                    </a:cxn>
+                    <a:cxn ang="0">
+                      <a:pos x="T22" y="T23"/>
+                    </a:cxn>
+                  </a:cxnLst>
+                  <a:rect l="T24" t="T25" r="T26" b="T27"/>
+                  <a:pathLst>
+                    <a:path w="21600" h="21600" extrusionOk="0">
+                      <a:moveTo>
+                        <a:pt x="0" y="18014"/>
+                      </a:moveTo>
+                      <a:lnTo>
+                        <a:pt x="0" y="2800"/>
+                      </a:lnTo>
+                      <a:lnTo>
+                        <a:pt x="1645" y="2800"/>
+                      </a:lnTo>
+                      <a:lnTo>
+                        <a:pt x="1645" y="1428"/>
+                      </a:lnTo>
+                      <a:lnTo>
+                        <a:pt x="3468" y="1428"/>
+                      </a:lnTo>
+                      <a:lnTo>
+                        <a:pt x="3468" y="0"/>
+                      </a:lnTo>
+                      <a:lnTo>
+                        <a:pt x="21653" y="0"/>
+                      </a:lnTo>
+                      <a:lnTo>
+                        <a:pt x="21653" y="18828"/>
+                      </a:lnTo>
+                      <a:lnTo>
+                        <a:pt x="19954" y="18828"/>
+                      </a:lnTo>
+                      <a:lnTo>
+                        <a:pt x="19954" y="20214"/>
+                      </a:lnTo>
+                      <a:lnTo>
+                        <a:pt x="18256" y="20214"/>
+                      </a:lnTo>
+                      <a:lnTo>
+                        <a:pt x="18256" y="21600"/>
+                      </a:lnTo>
+                      <a:lnTo>
+                        <a:pt x="4434" y="21600"/>
+                      </a:lnTo>
+                      <a:lnTo>
+                        <a:pt x="0" y="18014"/>
+                      </a:lnTo>
+                      <a:close/>
+                    </a:path>
+                    <a:path w="21600" h="21600" extrusionOk="0">
+                      <a:moveTo>
+                        <a:pt x="3486" y="1428"/>
+                      </a:moveTo>
+                      <a:lnTo>
+                        <a:pt x="19954" y="1428"/>
+                      </a:lnTo>
+                      <a:lnTo>
+                        <a:pt x="19954" y="20214"/>
+                      </a:lnTo>
+                      <a:lnTo>
+                        <a:pt x="18256" y="20214"/>
+                      </a:lnTo>
+                      <a:lnTo>
+                        <a:pt x="18256" y="2800"/>
+                      </a:lnTo>
+                      <a:lnTo>
+                        <a:pt x="1645" y="2800"/>
+                      </a:lnTo>
+                      <a:lnTo>
+                        <a:pt x="1645" y="1428"/>
+                      </a:lnTo>
+                      <a:lnTo>
+                        <a:pt x="3486" y="1428"/>
+                      </a:lnTo>
+                      <a:close/>
+                    </a:path>
+                    <a:path w="21600" h="21600" extrusionOk="0">
+                      <a:moveTo>
+                        <a:pt x="0" y="18014"/>
+                      </a:moveTo>
+                      <a:lnTo>
+                        <a:pt x="4434" y="18000"/>
+                      </a:lnTo>
+                      <a:lnTo>
+                        <a:pt x="4434" y="21600"/>
+                      </a:lnTo>
+                      <a:lnTo>
+                        <a:pt x="0" y="18014"/>
+                      </a:lnTo>
+                      <a:close/>
+                    </a:path>
+                  </a:pathLst>
+                </a:custGeom>
+                <a:solidFill>
+                  <a:srgbClr val="D8EBB3"/>
+                </a:solidFill>
+                <a:ln w="9525">
+                  <a:solidFill>
+                    <a:srgbClr val="000000"/>
+                  </a:solidFill>
+                  <a:miter lim="800000"/>
+                  <a:headEnd/>
+                  <a:tailEnd/>
+                </a:ln>
+                <a:effectLst>
+                  <a:outerShdw dist="107763" dir="2700000" algn="ctr" rotWithShape="0">
+                    <a:srgbClr val="808080"/>
+                  </a:outerShdw>
+                </a:effectLst>
+              </p:spPr>
+              <p:txBody>
+                <a:bodyPr tIns="0"/>
+                <a:lstStyle/>
+                <a:p>
+                  <a:pPr marL="685800" indent="-685800" algn="ctr">
+                    <a:defRPr/>
+                  </a:pPr>
+                  <a:r>
+                    <a:rPr lang="en-US" sz="1800" dirty="0" smtClean="0">
+                      <a:solidFill>
+                        <a:schemeClr val="bg2"/>
+                      </a:solidFill>
+                    </a:rPr>
+                    <a:t>&lt;</a:t>
+                  </a:r>
+                  <a:r>
+                    <a:rPr lang="en-US" sz="1800" dirty="0" smtClean="0">
+                      <a:solidFill>
+                        <a:schemeClr val="bg2"/>
+                      </a:solidFill>
+                    </a:rPr>
+                    <a:t>hydro</a:t>
+                  </a:r>
+                  <a:r>
+                    <a:rPr lang="en-US" sz="1800" dirty="0" smtClean="0">
+                      <a:solidFill>
+                        <a:schemeClr val="bg2"/>
+                      </a:solidFill>
+                    </a:rPr>
+                    <a:t>.inp&gt;</a:t>
+                  </a:r>
+                  <a:endParaRPr lang="en-US" sz="1800" dirty="0">
+                    <a:solidFill>
+                      <a:schemeClr val="bg2"/>
+                    </a:solidFill>
+                  </a:endParaRPr>
+                </a:p>
+                <a:p>
+                  <a:pPr marL="685800" indent="-685800">
+                    <a:defRPr/>
+                  </a:pPr>
+                  <a:endParaRPr lang="en-US" sz="600" dirty="0">
+                    <a:solidFill>
+                      <a:schemeClr val="bg2"/>
+                    </a:solidFill>
+                  </a:endParaRPr>
+                </a:p>
+                <a:p>
+                  <a:pPr marL="685800" indent="-685800">
+                    <a:defRPr/>
+                  </a:pPr>
+                  <a:r>
+                    <a:rPr lang="en-US" sz="1800" dirty="0" smtClean="0">
+                      <a:solidFill>
+                        <a:schemeClr val="bg2"/>
+                      </a:solidFill>
+                    </a:rPr>
+                    <a:t>CONFIGURATION</a:t>
+                  </a:r>
+                </a:p>
+                <a:p>
+                  <a:pPr marL="685800" indent="-685800">
+                    <a:defRPr/>
+                  </a:pPr>
+                  <a:r>
+                    <a:rPr lang="en-US" sz="1800" dirty="0" smtClean="0">
+                      <a:solidFill>
+                        <a:schemeClr val="bg2"/>
+                      </a:solidFill>
+                    </a:rPr>
+                    <a:t>config.inp</a:t>
+                  </a:r>
+                </a:p>
+                <a:p>
+                  <a:pPr marL="685800" indent="-685800">
+                    <a:defRPr/>
+                  </a:pPr>
+                  <a:r>
+                    <a:rPr lang="en-US" sz="1800" dirty="0" smtClean="0">
+                      <a:solidFill>
+                        <a:schemeClr val="bg2"/>
+                      </a:solidFill>
+                    </a:rPr>
+                    <a:t>END</a:t>
+                  </a:r>
+                  <a:endParaRPr lang="en-US" sz="1800" dirty="0">
+                    <a:solidFill>
+                      <a:schemeClr val="bg2"/>
+                    </a:solidFill>
+                  </a:endParaRPr>
+                </a:p>
+              </p:txBody>
+            </p:sp>
+            <p:sp>
+              <p:nvSpPr>
+                <p:cNvPr id="22" name="Document"/>
+                <p:cNvSpPr>
+                  <a:spLocks noEditPoints="1" noChangeArrowheads="1"/>
+                </p:cNvSpPr>
+                <p:nvPr/>
+              </p:nvSpPr>
+              <p:spPr bwMode="auto">
+                <a:xfrm>
+                  <a:off x="841" y="2675"/>
+                  <a:ext cx="1869" cy="1451"/>
+                </a:xfrm>
+                <a:custGeom>
+                  <a:avLst/>
+                  <a:gdLst>
+                    <a:gd name="T0" fmla="*/ 10757 w 21600"/>
+                    <a:gd name="T1" fmla="*/ 21632 h 21600"/>
+                    <a:gd name="T2" fmla="*/ 85 w 21600"/>
+                    <a:gd name="T3" fmla="*/ 10849 h 21600"/>
+                    <a:gd name="T4" fmla="*/ 10757 w 21600"/>
+                    <a:gd name="T5" fmla="*/ 81 h 21600"/>
+                    <a:gd name="T6" fmla="*/ 21706 w 21600"/>
+                    <a:gd name="T7" fmla="*/ 10652 h 21600"/>
+                    <a:gd name="T8" fmla="*/ 10757 w 21600"/>
+                    <a:gd name="T9" fmla="*/ 21632 h 21600"/>
+                    <a:gd name="T10" fmla="*/ 0 w 21600"/>
+                    <a:gd name="T11" fmla="*/ 0 h 21600"/>
+                    <a:gd name="T12" fmla="*/ 21600 w 21600"/>
+                    <a:gd name="T13" fmla="*/ 0 h 21600"/>
+                    <a:gd name="T14" fmla="*/ 21600 w 21600"/>
+                    <a:gd name="T15" fmla="*/ 21600 h 21600"/>
+                    <a:gd name="T16" fmla="*/ 977 w 21600"/>
+                    <a:gd name="T17" fmla="*/ 818 h 21600"/>
+                    <a:gd name="T18" fmla="*/ 20622 w 21600"/>
+                    <a:gd name="T19" fmla="*/ 16429 h 21600"/>
+                  </a:gdLst>
+                  <a:ahLst/>
+                  <a:cxnLst>
+                    <a:cxn ang="0">
+                      <a:pos x="T0" y="T1"/>
+                    </a:cxn>
+                    <a:cxn ang="0">
+                      <a:pos x="T2" y="T3"/>
+                    </a:cxn>
+                    <a:cxn ang="0">
+                      <a:pos x="T4" y="T5"/>
+                    </a:cxn>
+                    <a:cxn ang="0">
+                      <a:pos x="T6" y="T7"/>
+                    </a:cxn>
+                    <a:cxn ang="0">
+                      <a:pos x="T8" y="T9"/>
+                    </a:cxn>
+                    <a:cxn ang="0">
+                      <a:pos x="T10" y="T11"/>
+                    </a:cxn>
+                    <a:cxn ang="0">
+                      <a:pos x="T12" y="T13"/>
+                    </a:cxn>
+                    <a:cxn ang="0">
+                      <a:pos x="T14" y="T15"/>
+                    </a:cxn>
+                  </a:cxnLst>
+                  <a:rect l="T16" t="T17" r="T18" b="T19"/>
+                  <a:pathLst>
+                    <a:path w="21600" h="21600">
+                      <a:moveTo>
+                        <a:pt x="10757" y="21632"/>
+                      </a:moveTo>
+                      <a:lnTo>
+                        <a:pt x="5187" y="21632"/>
+                      </a:lnTo>
+                      <a:lnTo>
+                        <a:pt x="85" y="17509"/>
+                      </a:lnTo>
+                      <a:lnTo>
+                        <a:pt x="85" y="10849"/>
+                      </a:lnTo>
+                      <a:lnTo>
+                        <a:pt x="85" y="81"/>
+                      </a:lnTo>
+                      <a:lnTo>
+                        <a:pt x="10757" y="81"/>
+                      </a:lnTo>
+                      <a:lnTo>
+                        <a:pt x="21706" y="81"/>
+                      </a:lnTo>
+                      <a:lnTo>
+                        <a:pt x="21706" y="10652"/>
+                      </a:lnTo>
+                      <a:lnTo>
+                        <a:pt x="21706" y="21632"/>
+                      </a:lnTo>
+                      <a:lnTo>
+                        <a:pt x="10757" y="21632"/>
+                      </a:lnTo>
+                      <a:close/>
+                    </a:path>
+                    <a:path w="21600" h="21600">
+                      <a:moveTo>
+                        <a:pt x="85" y="17509"/>
+                      </a:moveTo>
+                      <a:lnTo>
+                        <a:pt x="5187" y="17509"/>
+                      </a:lnTo>
+                      <a:lnTo>
+                        <a:pt x="5187" y="21632"/>
+                      </a:lnTo>
+                      <a:lnTo>
+                        <a:pt x="85" y="17509"/>
+                      </a:lnTo>
+                      <a:close/>
+                    </a:path>
+                  </a:pathLst>
+                </a:custGeom>
+                <a:solidFill>
+                  <a:srgbClr val="D8EBB3"/>
+                </a:solidFill>
+                <a:ln w="9525">
+                  <a:solidFill>
+                    <a:srgbClr val="000000"/>
+                  </a:solidFill>
+                  <a:miter lim="800000"/>
+                  <a:headEnd/>
+                  <a:tailEnd/>
+                </a:ln>
+                <a:effectLst>
+                  <a:outerShdw dist="107763" dir="2700000" algn="ctr" rotWithShape="0">
+                    <a:srgbClr val="808080"/>
+                  </a:outerShdw>
+                </a:effectLst>
+              </p:spPr>
+              <p:txBody>
+                <a:bodyPr/>
+                <a:lstStyle/>
+                <a:p>
+                  <a:pPr>
+                    <a:defRPr/>
+                  </a:pPr>
+                  <a:r>
+                    <a:rPr lang="en-US" sz="2000" dirty="0" smtClean="0">
+                      <a:solidFill>
+                        <a:schemeClr val="bg2"/>
+                      </a:solidFill>
+                    </a:rPr>
+                    <a:t>ENVVAR</a:t>
+                  </a:r>
+                  <a:endParaRPr lang="en-US" sz="2000" dirty="0">
+                    <a:solidFill>
+                      <a:schemeClr val="bg2"/>
+                    </a:solidFill>
+                  </a:endParaRPr>
+                </a:p>
+                <a:p>
+                  <a:pPr>
+                    <a:defRPr/>
+                  </a:pPr>
+                  <a:r>
+                    <a:rPr lang="en-US" sz="2000" dirty="0" smtClean="0">
+                      <a:solidFill>
+                        <a:schemeClr val="bg2"/>
+                      </a:solidFill>
+                    </a:rPr>
+                    <a:t>NAME                  VALUE</a:t>
+                  </a:r>
+                  <a:endParaRPr lang="en-US" sz="2000" dirty="0">
+                    <a:solidFill>
+                      <a:schemeClr val="bg2"/>
+                    </a:solidFill>
+                  </a:endParaRPr>
+                </a:p>
+                <a:p>
+                  <a:pPr>
+                    <a:defRPr/>
+                  </a:pPr>
+                  <a:r>
+                    <a:rPr lang="en-US" sz="2000" dirty="0" smtClean="0">
+                      <a:solidFill>
+                        <a:schemeClr val="bg2"/>
+                      </a:solidFill>
+                    </a:rPr>
+                    <a:t>STUDYDIR           .</a:t>
+                  </a:r>
+                  <a:endParaRPr lang="en-US" sz="2000" dirty="0">
+                    <a:solidFill>
+                      <a:schemeClr val="bg2"/>
+                    </a:solidFill>
+                  </a:endParaRPr>
+                </a:p>
+                <a:p>
+                  <a:pPr>
+                    <a:defRPr/>
+                  </a:pPr>
+                  <a:r>
+                    <a:rPr lang="en-US" sz="2000" dirty="0" smtClean="0">
+                      <a:solidFill>
+                        <a:schemeClr val="bg2"/>
+                      </a:solidFill>
+                    </a:rPr>
+                    <a:t>DSM2MODIFIER  base</a:t>
+                  </a:r>
+                  <a:endParaRPr lang="en-US" sz="2000" dirty="0">
+                    <a:solidFill>
+                      <a:schemeClr val="bg2"/>
+                    </a:solidFill>
+                  </a:endParaRPr>
+                </a:p>
+                <a:p>
+                  <a:pPr>
+                    <a:defRPr/>
+                  </a:pPr>
+                  <a:r>
+                    <a:rPr lang="en-US" sz="2000" dirty="0" smtClean="0">
+                      <a:solidFill>
+                        <a:schemeClr val="bg2"/>
+                      </a:solidFill>
+                    </a:rPr>
+                    <a:t>END</a:t>
+                  </a:r>
+                  <a:endParaRPr lang="en-US" sz="2000" dirty="0">
+                    <a:solidFill>
+                      <a:schemeClr val="bg2"/>
+                    </a:solidFill>
+                  </a:endParaRPr>
+                </a:p>
+              </p:txBody>
+            </p:sp>
+            <p:sp>
+              <p:nvSpPr>
+                <p:cNvPr id="23" name="Line 15"/>
+                <p:cNvSpPr>
+                  <a:spLocks noChangeShapeType="1"/>
+                </p:cNvSpPr>
+                <p:nvPr/>
+              </p:nvSpPr>
+              <p:spPr bwMode="auto">
+                <a:xfrm flipV="1">
+                  <a:off x="2731" y="2874"/>
+                  <a:ext cx="375" cy="255"/>
+                </a:xfrm>
+                <a:prstGeom prst="line">
+                  <a:avLst/>
+                </a:prstGeom>
+                <a:noFill/>
+                <a:ln w="25400">
+                  <a:solidFill>
+                    <a:schemeClr val="bg2"/>
+                  </a:solidFill>
+                  <a:round/>
+                  <a:headEnd/>
+                  <a:tailEnd type="triangle" w="lg" len="lg"/>
+                </a:ln>
+              </p:spPr>
+              <p:txBody>
+                <a:bodyPr/>
+                <a:lstStyle/>
+                <a:p>
+                  <a:endParaRPr lang="en-US"/>
+                </a:p>
+              </p:txBody>
+            </p:sp>
+            <p:sp>
+              <p:nvSpPr>
+                <p:cNvPr id="24" name="Line 17"/>
+                <p:cNvSpPr>
+                  <a:spLocks noChangeShapeType="1"/>
+                </p:cNvSpPr>
+                <p:nvPr/>
+              </p:nvSpPr>
+              <p:spPr bwMode="auto">
+                <a:xfrm flipV="1">
+                  <a:off x="2739" y="3059"/>
+                  <a:ext cx="350" cy="73"/>
+                </a:xfrm>
+                <a:prstGeom prst="line">
+                  <a:avLst/>
+                </a:prstGeom>
+                <a:noFill/>
+                <a:ln w="25400">
+                  <a:solidFill>
+                    <a:schemeClr val="bg2"/>
+                  </a:solidFill>
+                  <a:round/>
+                  <a:headEnd/>
+                  <a:tailEnd type="triangle" w="lg" len="lg"/>
+                </a:ln>
+              </p:spPr>
+              <p:txBody>
+                <a:bodyPr/>
+                <a:lstStyle/>
+                <a:p>
+                  <a:endParaRPr lang="en-US"/>
+                </a:p>
+              </p:txBody>
+            </p:sp>
+            <p:sp>
+              <p:nvSpPr>
+                <p:cNvPr id="25" name="Line 18"/>
+                <p:cNvSpPr>
+                  <a:spLocks noChangeShapeType="1"/>
+                </p:cNvSpPr>
+                <p:nvPr/>
+              </p:nvSpPr>
+              <p:spPr bwMode="auto">
+                <a:xfrm flipV="1">
+                  <a:off x="2735" y="2957"/>
+                  <a:ext cx="387" cy="182"/>
+                </a:xfrm>
+                <a:prstGeom prst="line">
+                  <a:avLst/>
+                </a:prstGeom>
+                <a:noFill/>
+                <a:ln w="25400">
+                  <a:solidFill>
+                    <a:schemeClr val="bg2"/>
+                  </a:solidFill>
+                  <a:round/>
+                  <a:headEnd/>
+                  <a:tailEnd type="triangle" w="lg" len="lg"/>
+                </a:ln>
+              </p:spPr>
+              <p:txBody>
+                <a:bodyPr/>
+                <a:lstStyle/>
+                <a:p>
+                  <a:endParaRPr lang="en-US"/>
+                </a:p>
+              </p:txBody>
+            </p:sp>
+            <p:sp>
+              <p:nvSpPr>
+                <p:cNvPr id="26" name="Text Box 19"/>
+                <p:cNvSpPr txBox="1">
+                  <a:spLocks noChangeArrowheads="1"/>
+                </p:cNvSpPr>
+                <p:nvPr/>
+              </p:nvSpPr>
+              <p:spPr bwMode="auto">
+                <a:xfrm>
+                  <a:off x="3819" y="2622"/>
+                  <a:ext cx="831" cy="163"/>
+                </a:xfrm>
+                <a:prstGeom prst="rect">
+                  <a:avLst/>
+                </a:prstGeom>
+                <a:noFill/>
+                <a:ln w="9525">
+                  <a:noFill/>
+                  <a:miter lim="800000"/>
+                  <a:headEnd/>
+                  <a:tailEnd/>
+                </a:ln>
+              </p:spPr>
+              <p:txBody>
+                <a:bodyPr wrap="square">
+                  <a:spAutoFit/>
+                </a:bodyPr>
+                <a:lstStyle/>
+                <a:p>
+                  <a:pPr algn="ctr">
+                    <a:spcBef>
+                      <a:spcPct val="50000"/>
+                    </a:spcBef>
+                  </a:pPr>
+                  <a:r>
+                    <a:rPr lang="en-US" sz="1800" dirty="0" smtClean="0">
+                      <a:solidFill>
+                        <a:schemeClr val="bg2"/>
+                      </a:solidFill>
+                    </a:rPr>
+                    <a:t>&lt;q</a:t>
+                  </a:r>
+                  <a:r>
+                    <a:rPr lang="en-US" sz="1800" dirty="0" smtClean="0">
+                      <a:solidFill>
+                        <a:schemeClr val="bg2"/>
+                      </a:solidFill>
+                    </a:rPr>
+                    <a:t>ual.inp&gt;</a:t>
+                  </a:r>
+                  <a:endParaRPr lang="en-US" sz="1800" dirty="0">
+                    <a:solidFill>
+                      <a:schemeClr val="bg2"/>
+                    </a:solidFill>
+                  </a:endParaRPr>
+                </a:p>
+              </p:txBody>
+            </p:sp>
+          </p:grpSp>
+          <p:sp>
+            <p:nvSpPr>
+              <p:cNvPr id="27" name="Text Box 19"/>
+              <p:cNvSpPr txBox="1">
+                <a:spLocks noChangeArrowheads="1"/>
+              </p:cNvSpPr>
+              <p:nvPr/>
+            </p:nvSpPr>
+            <p:spPr bwMode="auto">
+              <a:xfrm>
+                <a:off x="6863163" y="1677154"/>
+                <a:ext cx="1467172" cy="369332"/>
+              </a:xfrm>
+              <a:prstGeom prst="rect">
+                <a:avLst/>
+              </a:prstGeom>
+              <a:noFill/>
+              <a:ln w="9525">
+                <a:noFill/>
+                <a:miter lim="800000"/>
+                <a:headEnd/>
+                <a:tailEnd/>
+              </a:ln>
+            </p:spPr>
+            <p:txBody>
+              <a:bodyPr wrap="square">
+                <a:spAutoFit/>
+              </a:bodyPr>
+              <a:lstStyle/>
+              <a:p>
+                <a:pPr algn="ctr">
+                  <a:spcBef>
+                    <a:spcPct val="50000"/>
+                  </a:spcBef>
+                </a:pPr>
+                <a:r>
+                  <a:rPr lang="en-US" sz="1800" dirty="0" smtClean="0">
+                    <a:solidFill>
+                      <a:schemeClr val="bg2"/>
+                    </a:solidFill>
+                  </a:rPr>
+                  <a:t>&lt;ptm</a:t>
+                </a:r>
+                <a:r>
+                  <a:rPr lang="en-US" sz="1800" dirty="0" smtClean="0">
+                    <a:solidFill>
+                      <a:schemeClr val="bg2"/>
+                    </a:solidFill>
+                  </a:rPr>
+                  <a:t>.inp&gt;</a:t>
+                </a:r>
+                <a:endParaRPr lang="en-US" sz="1800" dirty="0">
+                  <a:solidFill>
+                    <a:schemeClr val="bg2"/>
+                  </a:solidFill>
+                </a:endParaRPr>
+              </a:p>
+            </p:txBody>
+          </p:sp>
+          <p:sp>
+            <p:nvSpPr>
+              <p:cNvPr id="29" name="Text Box 19"/>
+              <p:cNvSpPr txBox="1">
+                <a:spLocks noChangeArrowheads="1"/>
+              </p:cNvSpPr>
+              <p:nvPr/>
+            </p:nvSpPr>
+            <p:spPr bwMode="auto">
+              <a:xfrm>
+                <a:off x="2456481" y="2015536"/>
+                <a:ext cx="1616989" cy="369332"/>
+              </a:xfrm>
+              <a:prstGeom prst="rect">
+                <a:avLst/>
+              </a:prstGeom>
+              <a:noFill/>
+              <a:ln w="9525">
+                <a:noFill/>
+                <a:miter lim="800000"/>
+                <a:headEnd/>
+                <a:tailEnd/>
+              </a:ln>
+            </p:spPr>
+            <p:txBody>
+              <a:bodyPr wrap="square">
+                <a:spAutoFit/>
+              </a:bodyPr>
+              <a:lstStyle/>
+              <a:p>
+                <a:pPr algn="ctr">
+                  <a:spcBef>
+                    <a:spcPct val="50000"/>
+                  </a:spcBef>
+                </a:pPr>
+                <a:r>
+                  <a:rPr lang="en-US" sz="1800" dirty="0" smtClean="0">
+                    <a:solidFill>
+                      <a:schemeClr val="bg2"/>
+                    </a:solidFill>
+                  </a:rPr>
+                  <a:t>&lt;config</a:t>
+                </a:r>
+                <a:r>
+                  <a:rPr lang="en-US" sz="1800" dirty="0" smtClean="0">
+                    <a:solidFill>
+                      <a:schemeClr val="bg2"/>
+                    </a:solidFill>
+                  </a:rPr>
+                  <a:t>.inp&gt;</a:t>
+                </a:r>
+                <a:endParaRPr lang="en-US" sz="1800" dirty="0">
+                  <a:solidFill>
+                    <a:schemeClr val="bg2"/>
+                  </a:solidFill>
+                </a:endParaRPr>
+              </a:p>
+            </p:txBody>
+          </p:sp>
+        </p:grpSp>
+        <p:sp>
+          <p:nvSpPr>
+            <p:cNvPr id="32" name="Left-Right Arrow 31"/>
+            <p:cNvSpPr/>
+            <p:nvPr/>
+          </p:nvSpPr>
+          <p:spPr bwMode="auto">
+            <a:xfrm>
+              <a:off x="3160039" y="3808093"/>
+              <a:ext cx="2270501" cy="751668"/>
+            </a:xfrm>
+            <a:prstGeom prst="leftRightArrow">
+              <a:avLst/>
+            </a:prstGeom>
+            <a:solidFill>
+              <a:schemeClr val="accent4">
+                <a:lumMod val="90000"/>
+              </a:schemeClr>
+            </a:solidFill>
+            <a:ln w="9525" cap="flat" cmpd="sng" algn="ctr">
+              <a:solidFill>
+                <a:schemeClr val="bg1">
+                  <a:lumMod val="75000"/>
+                </a:schemeClr>
+              </a:solidFill>
+              <a:prstDash val="solid"/>
+              <a:round/>
+              <a:headEnd type="none" w="med" len="med"/>
+              <a:tailEnd type="none" w="med" len="med"/>
+            </a:ln>
+            <a:effectLst/>
+          </p:spPr>
+          <p:txBody>
+            <a:bodyPr vert="horz" wrap="square" lIns="91440" tIns="45720" rIns="91440" bIns="45720" numCol="1" rtlCol="0" anchor="ctr" anchorCtr="0" compatLnSpc="1">
+              <a:prstTxWarp prst="textNoShape">
+                <a:avLst/>
+              </a:prstTxWarp>
+            </a:bodyPr>
+            <a:lstStyle/>
+            <a:p>
+              <a:pPr marL="0" marR="0" indent="0" algn="ctr" defTabSz="914400" rtl="0" eaLnBrk="0" fontAlgn="base" latinLnBrk="0" hangingPunct="0">
+                <a:lnSpc>
+                  <a:spcPct val="100000"/>
+                </a:lnSpc>
+                <a:spcBef>
+                  <a:spcPct val="0"/>
+                </a:spcBef>
+                <a:spcAft>
+                  <a:spcPct val="0"/>
+                </a:spcAft>
+                <a:buClrTx/>
+                <a:buSzTx/>
+                <a:buFontTx/>
+                <a:buNone/>
+                <a:tabLst/>
+              </a:pPr>
+              <a:r>
+                <a:rPr kumimoji="0" lang="en-US" sz="2400" b="1" i="0" u="none" strike="noStrike" cap="none" normalizeH="0" baseline="0" dirty="0" smtClean="0">
+                  <a:ln>
+                    <a:noFill/>
+                  </a:ln>
+                  <a:solidFill>
+                    <a:schemeClr val="bg1">
+                      <a:lumMod val="50000"/>
+                    </a:schemeClr>
+                  </a:solidFill>
+                  <a:effectLst/>
+                  <a:latin typeface="Arial" charset="0"/>
+                </a:rPr>
+                <a:t>Reused</a:t>
+              </a:r>
+              <a:endParaRPr kumimoji="0" lang="en-US" sz="2400" b="1" i="0" u="none" strike="noStrike" cap="none" normalizeH="0" baseline="0" dirty="0" smtClean="0">
+                <a:ln>
+                  <a:noFill/>
+                </a:ln>
+                <a:solidFill>
+                  <a:schemeClr val="bg1">
+                    <a:lumMod val="50000"/>
+                  </a:schemeClr>
+                </a:solidFill>
+                <a:effectLst/>
+                <a:latin typeface="Arial" charset="0"/>
+              </a:endParaRPr>
+            </a:p>
+          </p:txBody>
+        </p:sp>
+      </p:grpSp>
+    </p:spTree>
+  </p:cSld>
+  <p:clrMapOvr>
+    <a:masterClrMapping/>
+  </p:clrMapOvr>
+  <p:transition/>
+</p:sld>
+</file>
+
+<file path=ppt/slides/slide11.xml><?xml version="1.0" encoding="utf-8"?>
+<p:sld xmlns:a="http://schemas.openxmlformats.org/drawingml/2006/main" xmlns:r="http://schemas.openxmlformats.org/officeDocument/2006/relationships" xmlns:p="http://schemas.openxmlformats.org/presentationml/2006/main">
+  <p:cSld>
+    <p:spTree>
+      <p:nvGrpSpPr>
+        <p:cNvPr id="1" name=""/>
+        <p:cNvGrpSpPr/>
+        <p:nvPr/>
+      </p:nvGrpSpPr>
+      <p:grpSpPr>
+        <a:xfrm>
+          <a:off x="0" y="0"/>
+          <a:ext cx="0" cy="0"/>
+          <a:chOff x="0" y="0"/>
+          <a:chExt cx="0" cy="0"/>
+        </a:xfrm>
+      </p:grpSpPr>
+      <p:sp>
+        <p:nvSpPr>
+          <p:cNvPr id="31745" name="Rectangle 2"/>
+          <p:cNvSpPr>
+            <a:spLocks noGrp="1" noChangeArrowheads="1"/>
+          </p:cNvSpPr>
+          <p:nvPr>
+            <p:ph type="title"/>
+          </p:nvPr>
+        </p:nvSpPr>
+        <p:spPr/>
+        <p:txBody>
+          <a:bodyPr/>
+          <a:lstStyle/>
+          <a:p>
+            <a:r>
+              <a:rPr lang="en-US" smtClean="0"/>
+              <a:t>Style</a:t>
+            </a:r>
+          </a:p>
+        </p:txBody>
+      </p:sp>
+      <p:sp>
+        <p:nvSpPr>
+          <p:cNvPr id="31746" name="Rectangle 3"/>
+          <p:cNvSpPr>
+            <a:spLocks noGrp="1" noChangeArrowheads="1"/>
+          </p:cNvSpPr>
+          <p:nvPr>
+            <p:ph type="body" idx="1"/>
+          </p:nvPr>
+        </p:nvSpPr>
+        <p:spPr>
+          <a:xfrm>
+            <a:off x="685800" y="1814513"/>
+            <a:ext cx="7772400" cy="4114800"/>
+          </a:xfrm>
+        </p:spPr>
+        <p:txBody>
+          <a:bodyPr/>
+          <a:lstStyle/>
+          <a:p>
+            <a:r>
+              <a:rPr lang="en-US" dirty="0" smtClean="0"/>
+              <a:t>Use Upper Case:</a:t>
+            </a:r>
+          </a:p>
+          <a:p>
+            <a:pPr lvl="1"/>
+            <a:r>
+              <a:rPr lang="en-US" dirty="0" smtClean="0"/>
+              <a:t>Table/Include Block Names and Headers</a:t>
+            </a:r>
+          </a:p>
+          <a:p>
+            <a:pPr lvl="1"/>
+            <a:r>
+              <a:rPr lang="en-US" dirty="0" smtClean="0"/>
+              <a:t>ENVVAR substitution ${LIKE_THIS}</a:t>
+            </a:r>
+          </a:p>
+          <a:p>
+            <a:pPr lvl="1"/>
+            <a:r>
+              <a:rPr lang="en-US" dirty="0" smtClean="0"/>
+              <a:t>Constants in op rules</a:t>
+            </a:r>
+          </a:p>
+          <a:p>
+            <a:r>
+              <a:rPr lang="en-US" dirty="0" smtClean="0"/>
+              <a:t>Use </a:t>
+            </a:r>
+            <a:r>
+              <a:rPr lang="en-US" dirty="0" err="1" smtClean="0"/>
+              <a:t>lower_case</a:t>
+            </a:r>
+            <a:r>
+              <a:rPr lang="en-US" dirty="0" smtClean="0"/>
+              <a:t> everywhere else</a:t>
+            </a:r>
+          </a:p>
+          <a:p>
+            <a:r>
+              <a:rPr lang="en-US" dirty="0" smtClean="0"/>
+              <a:t>Set your text editor for spaces, not tabs</a:t>
+            </a:r>
+          </a:p>
+          <a:p>
+            <a:endParaRPr lang="en-US" dirty="0" smtClean="0"/>
+          </a:p>
+          <a:p>
+            <a:pPr lvl="1"/>
+            <a:endParaRPr lang="en-US" dirty="0" smtClean="0"/>
+          </a:p>
+        </p:txBody>
+      </p:sp>
+    </p:spTree>
+  </p:cSld>
+  <p:clrMapOvr>
+    <a:masterClrMapping/>
+  </p:clrMapOvr>
+  <p:transition/>
+</p:sld>
+</file>
+
+<file path=ppt/slides/slide12.xml><?xml version="1.0" encoding="utf-8"?>
+<p:sld xmlns:a="http://schemas.openxmlformats.org/drawingml/2006/main" xmlns:r="http://schemas.openxmlformats.org/officeDocument/2006/relationships" xmlns:p="http://schemas.openxmlformats.org/presentationml/2006/main">
+  <p:cSld>
+    <p:spTree>
+      <p:nvGrpSpPr>
+        <p:cNvPr id="1" name=""/>
+        <p:cNvGrpSpPr/>
+        <p:nvPr/>
+      </p:nvGrpSpPr>
+      <p:grpSpPr>
+        <a:xfrm>
+          <a:off x="0" y="0"/>
+          <a:ext cx="0" cy="0"/>
+          <a:chOff x="0" y="0"/>
+          <a:chExt cx="0" cy="0"/>
+        </a:xfrm>
+      </p:grpSpPr>
+      <p:sp>
+        <p:nvSpPr>
           <p:cNvPr id="33793" name="Rectangle 4"/>
           <p:cNvSpPr>
             <a:spLocks noChangeArrowheads="1"/>
@@ -4636,7 +5968,7 @@
 </p:sld>
 </file>
 
-<file path=ppt/slides/slide11.xml><?xml version="1.0" encoding="utf-8"?>
+<file path=ppt/slides/slide13.xml><?xml version="1.0" encoding="utf-8"?>
 <p:sld xmlns:a="http://schemas.openxmlformats.org/drawingml/2006/main" xmlns:r="http://schemas.openxmlformats.org/officeDocument/2006/relationships" xmlns:p="http://schemas.openxmlformats.org/presentationml/2006/main">
   <p:cSld>
     <p:spTree>
@@ -4669,7 +6001,7 @@
           <a:lstStyle/>
           <a:p>
             <a:r>
-              <a:rPr lang="en-US" smtClean="0"/>
+              <a:rPr lang="en-US" dirty="0" smtClean="0"/>
               <a:t>For Version 6 Users</a:t>
             </a:r>
           </a:p>
@@ -4691,145 +6023,55 @@
           <a:lstStyle/>
           <a:p>
             <a:r>
-              <a:rPr lang="en-US" smtClean="0"/>
+              <a:rPr lang="en-US" dirty="0" smtClean="0"/>
               <a:t>Files must contain parent + child items</a:t>
             </a:r>
           </a:p>
           <a:p>
             <a:r>
-              <a:rPr lang="en-US" smtClean="0"/>
+              <a:rPr lang="en-US" dirty="0" smtClean="0"/>
               <a:t>Cannot redefine same item in same file</a:t>
             </a:r>
           </a:p>
           <a:p>
             <a:pPr lvl="1"/>
             <a:r>
-              <a:rPr lang="en-US" smtClean="0"/>
+              <a:rPr lang="en-US" dirty="0" smtClean="0"/>
               <a:t>Use comments</a:t>
             </a:r>
           </a:p>
           <a:p>
             <a:r>
-              <a:rPr lang="en-US" smtClean="0"/>
-              <a:t>Table structure is fixed</a:t>
-            </a:r>
-          </a:p>
-          <a:p>
-            <a:r>
-              <a:rPr lang="en-US" smtClean="0"/>
+              <a:rPr lang="en-US" dirty="0" smtClean="0"/>
+              <a:t>Table structure is </a:t>
+            </a:r>
+            <a:r>
+              <a:rPr lang="en-US" dirty="0" smtClean="0"/>
+              <a:t>fixed</a:t>
+            </a:r>
+          </a:p>
+          <a:p>
+            <a:r>
+              <a:rPr lang="en-US" dirty="0" smtClean="0"/>
+              <a:t>Configuration files are include blocks</a:t>
+            </a:r>
+            <a:endParaRPr lang="en-US" dirty="0" smtClean="0"/>
+          </a:p>
+          <a:p>
+            <a:r>
+              <a:rPr lang="en-US" dirty="0" smtClean="0"/>
               <a:t>Check out the echo.inp files!</a:t>
             </a:r>
           </a:p>
           <a:p>
             <a:pPr lvl="1"/>
             <a:r>
-              <a:rPr lang="en-US" smtClean="0"/>
+              <a:rPr lang="en-US" dirty="0" smtClean="0"/>
               <a:t>Also echoed in QUAL</a:t>
             </a:r>
           </a:p>
           <a:p>
-            <a:endParaRPr lang="en-US" smtClean="0"/>
-          </a:p>
-        </p:txBody>
-      </p:sp>
-    </p:spTree>
-  </p:cSld>
-  <p:clrMapOvr>
-    <a:masterClrMapping/>
-  </p:clrMapOvr>
-  <p:transition/>
-</p:sld>
-</file>
-
-<file path=ppt/slides/slide12.xml><?xml version="1.0" encoding="utf-8"?>
-<p:sld xmlns:a="http://schemas.openxmlformats.org/drawingml/2006/main" xmlns:r="http://schemas.openxmlformats.org/officeDocument/2006/relationships" xmlns:p="http://schemas.openxmlformats.org/presentationml/2006/main">
-  <p:cSld>
-    <p:spTree>
-      <p:nvGrpSpPr>
-        <p:cNvPr id="1" name=""/>
-        <p:cNvGrpSpPr/>
-        <p:nvPr/>
-      </p:nvGrpSpPr>
-      <p:grpSpPr>
-        <a:xfrm>
-          <a:off x="0" y="0"/>
-          <a:ext cx="0" cy="0"/>
-          <a:chOff x="0" y="0"/>
-          <a:chExt cx="0" cy="0"/>
-        </a:xfrm>
-      </p:grpSpPr>
-      <p:sp>
-        <p:nvSpPr>
-          <p:cNvPr id="2" name="Title 1"/>
-          <p:cNvSpPr>
-            <a:spLocks noGrp="1"/>
-          </p:cNvSpPr>
-          <p:nvPr>
-            <p:ph type="title"/>
-          </p:nvPr>
-        </p:nvSpPr>
-        <p:spPr/>
-        <p:txBody>
-          <a:bodyPr/>
-          <a:lstStyle/>
-          <a:p>
-            <a:r>
-              <a:rPr lang="en-US" dirty="0" smtClean="0"/>
-              <a:t>Add slides:</a:t>
-            </a:r>
-            <a:endParaRPr lang="en-US" dirty="0"/>
-          </a:p>
-        </p:txBody>
-      </p:sp>
-      <p:sp>
-        <p:nvSpPr>
-          <p:cNvPr id="3" name="Content Placeholder 2"/>
-          <p:cNvSpPr>
-            <a:spLocks noGrp="1"/>
-          </p:cNvSpPr>
-          <p:nvPr>
-            <p:ph idx="1"/>
-          </p:nvPr>
-        </p:nvSpPr>
-        <p:spPr/>
-        <p:txBody>
-          <a:bodyPr/>
-          <a:lstStyle/>
-          <a:p>
-            <a:r>
-              <a:rPr lang="en-US" dirty="0" smtClean="0"/>
-              <a:t>Configuration files</a:t>
-            </a:r>
-            <a:endParaRPr lang="en-US" dirty="0"/>
-          </a:p>
-        </p:txBody>
-      </p:sp>
-      <p:sp>
-        <p:nvSpPr>
-          <p:cNvPr id="4" name="Date Placeholder 3"/>
-          <p:cNvSpPr>
-            <a:spLocks noGrp="1"/>
-          </p:cNvSpPr>
-          <p:nvPr>
-            <p:ph type="dt" sz="half" idx="10"/>
-          </p:nvPr>
-        </p:nvSpPr>
-        <p:spPr/>
-        <p:txBody>
-          <a:bodyPr/>
-          <a:lstStyle/>
-          <a:p>
-            <a:pPr>
-              <a:defRPr/>
-            </a:pPr>
-            <a:fld id="{8F2E2A8A-7779-4380-895C-98F53310B698}" type="slidenum">
-              <a:rPr lang="en-US" smtClean="0"/>
-              <a:pPr>
-                <a:defRPr/>
-              </a:pPr>
-              <a:t>12</a:t>
-            </a:fld>
-            <a:endParaRPr lang="en-US"/>
+            <a:endParaRPr lang="en-US" dirty="0" smtClean="0"/>
           </a:p>
         </p:txBody>
       </p:sp>
@@ -7244,383 +8486,126 @@
       </p:grpSpPr>
       <p:sp>
         <p:nvSpPr>
-          <p:cNvPr id="29697" name="Rectangle 2"/>
+          <p:cNvPr id="2" name="Title 1"/>
           <p:cNvSpPr>
-            <a:spLocks noGrp="1" noChangeArrowheads="1"/>
+            <a:spLocks noGrp="1"/>
           </p:cNvSpPr>
           <p:nvPr>
             <p:ph type="title"/>
           </p:nvPr>
         </p:nvSpPr>
-        <p:spPr>
-          <a:xfrm>
-            <a:off x="685800" y="323850"/>
-            <a:ext cx="7870825" cy="1143000"/>
-          </a:xfrm>
-        </p:spPr>
+        <p:spPr/>
         <p:txBody>
           <a:bodyPr/>
           <a:lstStyle/>
           <a:p>
             <a:r>
-              <a:rPr lang="en-US" smtClean="0"/>
-              <a:t>ENVVAR: Text Substitution</a:t>
-            </a:r>
+              <a:rPr lang="en-US" dirty="0" smtClean="0"/>
+              <a:t>Layering Best Practices</a:t>
+            </a:r>
+            <a:endParaRPr lang="en-US" dirty="0"/>
           </a:p>
         </p:txBody>
       </p:sp>
       <p:sp>
         <p:nvSpPr>
-          <p:cNvPr id="29698" name="Rectangle 3"/>
+          <p:cNvPr id="4" name="Content Placeholder 3"/>
           <p:cNvSpPr>
-            <a:spLocks noGrp="1" noChangeArrowheads="1"/>
+            <a:spLocks noGrp="1"/>
           </p:cNvSpPr>
           <p:nvPr>
-            <p:ph type="body" idx="1"/>
+            <p:ph idx="1"/>
           </p:nvPr>
         </p:nvSpPr>
-        <p:spPr>
-          <a:xfrm>
-            <a:off x="300038" y="1362075"/>
-            <a:ext cx="8664575" cy="5059363"/>
-          </a:xfrm>
-        </p:spPr>
+        <p:spPr/>
         <p:txBody>
           <a:bodyPr/>
           <a:lstStyle/>
           <a:p>
+            <a:r>
+              <a:rPr lang="en-US" dirty="0" smtClean="0"/>
+              <a:t>Keep things thematic</a:t>
+            </a:r>
+          </a:p>
+          <a:p>
+            <a:r>
+              <a:rPr lang="en-US" dirty="0" smtClean="0"/>
+              <a:t>Don’t put your stuff in </a:t>
+            </a:r>
+            <a:r>
+              <a:rPr lang="en-US" dirty="0" err="1" smtClean="0"/>
+              <a:t>common_input</a:t>
+            </a:r>
+            <a:endParaRPr lang="en-US" dirty="0" smtClean="0"/>
+          </a:p>
+          <a:p>
+            <a:pPr lvl="1"/>
+            <a:r>
+              <a:rPr lang="en-US" dirty="0" smtClean="0"/>
+              <a:t>Make up something like /</a:t>
+            </a:r>
+            <a:r>
+              <a:rPr lang="en-US" dirty="0" err="1" smtClean="0"/>
+              <a:t>user_common</a:t>
+            </a:r>
+            <a:endParaRPr lang="en-US" dirty="0" smtClean="0"/>
+          </a:p>
+          <a:p>
+            <a:r>
+              <a:rPr lang="en-US" dirty="0" smtClean="0"/>
+              <a:t>Only override things you are changing</a:t>
+            </a:r>
+          </a:p>
+          <a:p>
+            <a:r>
+              <a:rPr lang="en-US" dirty="0" smtClean="0"/>
+              <a:t>Check the echoed input file</a:t>
+            </a:r>
+          </a:p>
+          <a:p>
+            <a:r>
+              <a:rPr lang="en-US" dirty="0" smtClean="0"/>
+              <a:t>Make sure you understand identifiers</a:t>
+            </a:r>
+          </a:p>
+          <a:p>
+            <a:pPr lvl="1"/>
+            <a:r>
+              <a:rPr lang="en-US" dirty="0" smtClean="0"/>
+              <a:t>The output ones are sneaky</a:t>
+            </a:r>
+          </a:p>
+          <a:p>
+            <a:endParaRPr lang="en-US" dirty="0" smtClean="0"/>
+          </a:p>
+        </p:txBody>
+      </p:sp>
+      <p:sp>
+        <p:nvSpPr>
+          <p:cNvPr id="3" name="Date Placeholder 2"/>
+          <p:cNvSpPr>
+            <a:spLocks noGrp="1"/>
+          </p:cNvSpPr>
+          <p:nvPr>
+            <p:ph type="dt" sz="half" idx="10"/>
+          </p:nvPr>
+        </p:nvSpPr>
+        <p:spPr/>
+        <p:txBody>
+          <a:bodyPr/>
+          <a:lstStyle/>
+          <a:p>
             <a:pPr>
-              <a:lnSpc>
-                <a:spcPct val="80000"/>
-              </a:lnSpc>
+              <a:defRPr/>
             </a:pPr>
-            <a:r>
-              <a:rPr lang="en-US" sz="2600" smtClean="0"/>
-              <a:t>Used for flexibility…avoids multiple files and erasing</a:t>
-            </a:r>
-          </a:p>
-          <a:p>
-            <a:pPr>
-              <a:lnSpc>
-                <a:spcPct val="80000"/>
-              </a:lnSpc>
-            </a:pPr>
-            <a:r>
-              <a:rPr lang="en-US" sz="2600" smtClean="0"/>
-              <a:t>Define in ENVVAR table (or OS environment):</a:t>
-            </a:r>
-          </a:p>
-          <a:p>
-            <a:pPr>
-              <a:lnSpc>
-                <a:spcPct val="80000"/>
-              </a:lnSpc>
-            </a:pPr>
-            <a:endParaRPr lang="en-US" sz="2600" smtClean="0"/>
-          </a:p>
-          <a:p>
-            <a:pPr>
-              <a:lnSpc>
-                <a:spcPct val="80000"/>
-              </a:lnSpc>
-            </a:pPr>
-            <a:endParaRPr lang="en-US" sz="2600" smtClean="0"/>
-          </a:p>
-          <a:p>
-            <a:pPr>
-              <a:lnSpc>
-                <a:spcPct val="80000"/>
-              </a:lnSpc>
-            </a:pPr>
-            <a:endParaRPr lang="en-US" sz="2600" smtClean="0"/>
-          </a:p>
-          <a:p>
-            <a:pPr>
-              <a:lnSpc>
-                <a:spcPct val="80000"/>
-              </a:lnSpc>
-            </a:pPr>
-            <a:endParaRPr lang="en-US" sz="2600" smtClean="0"/>
-          </a:p>
-          <a:p>
-            <a:pPr>
-              <a:lnSpc>
-                <a:spcPct val="80000"/>
-              </a:lnSpc>
-            </a:pPr>
-            <a:endParaRPr lang="en-US" sz="2600" smtClean="0"/>
-          </a:p>
-          <a:p>
-            <a:pPr>
-              <a:lnSpc>
-                <a:spcPct val="80000"/>
-              </a:lnSpc>
-            </a:pPr>
-            <a:endParaRPr lang="en-US" sz="2600" smtClean="0"/>
-          </a:p>
-          <a:p>
-            <a:pPr>
-              <a:lnSpc>
-                <a:spcPct val="80000"/>
-              </a:lnSpc>
-            </a:pPr>
-            <a:endParaRPr lang="en-US" sz="2600" smtClean="0"/>
-          </a:p>
-          <a:p>
-            <a:pPr>
-              <a:lnSpc>
-                <a:spcPct val="80000"/>
-              </a:lnSpc>
-            </a:pPr>
-            <a:r>
-              <a:rPr lang="en-US" sz="2600" smtClean="0"/>
-              <a:t>Subject to layering</a:t>
-            </a:r>
-          </a:p>
-          <a:p>
-            <a:pPr>
-              <a:lnSpc>
-                <a:spcPct val="80000"/>
-              </a:lnSpc>
-            </a:pPr>
-            <a:r>
-              <a:rPr lang="en-US" sz="2600" smtClean="0"/>
-              <a:t>Use anywhere else using ${ }:   </a:t>
-            </a:r>
-          </a:p>
-          <a:p>
-            <a:pPr>
-              <a:lnSpc>
-                <a:spcPct val="80000"/>
-              </a:lnSpc>
-            </a:pPr>
-            <a:r>
-              <a:rPr lang="en-US" sz="2600" smtClean="0"/>
-              <a:t>Nesting and interdependency allowed.</a:t>
-            </a:r>
-          </a:p>
-          <a:p>
-            <a:pPr>
-              <a:lnSpc>
-                <a:spcPct val="80000"/>
-              </a:lnSpc>
-            </a:pPr>
-            <a:endParaRPr lang="en-US" sz="2600" smtClean="0"/>
-          </a:p>
-          <a:p>
-            <a:pPr>
-              <a:lnSpc>
-                <a:spcPct val="80000"/>
-              </a:lnSpc>
-            </a:pPr>
-            <a:endParaRPr lang="en-US" sz="2600" smtClean="0"/>
-          </a:p>
-          <a:p>
-            <a:pPr>
-              <a:lnSpc>
-                <a:spcPct val="80000"/>
-              </a:lnSpc>
-              <a:buFontTx/>
-              <a:buNone/>
-            </a:pPr>
-            <a:endParaRPr lang="en-US" sz="2400" smtClean="0"/>
-          </a:p>
-        </p:txBody>
-      </p:sp>
-      <p:sp>
-        <p:nvSpPr>
-          <p:cNvPr id="29699" name="Rectangle 4"/>
-          <p:cNvSpPr>
-            <a:spLocks noChangeArrowheads="1"/>
-          </p:cNvSpPr>
-          <p:nvPr/>
-        </p:nvSpPr>
-        <p:spPr bwMode="auto">
-          <a:xfrm>
-            <a:off x="1455738" y="2981325"/>
-            <a:ext cx="4572000" cy="641350"/>
-          </a:xfrm>
-          <a:prstGeom prst="rect">
-            <a:avLst/>
-          </a:prstGeom>
-          <a:noFill/>
-          <a:ln w="9525">
-            <a:noFill/>
-            <a:miter lim="800000"/>
-            <a:headEnd/>
-            <a:tailEnd/>
-          </a:ln>
-        </p:spPr>
-        <p:txBody>
-          <a:bodyPr>
-            <a:spAutoFit/>
-          </a:bodyPr>
-          <a:lstStyle/>
-          <a:p>
-            <a:pPr marL="685800" indent="-685800"/>
+            <a:fld id="{567A6D4F-A7E5-4342-8FB6-C38B0C0F7DAE}" type="slidenum">
+              <a:rPr lang="en-US" smtClean="0"/>
+              <a:pPr>
+                <a:defRPr/>
+              </a:pPr>
+              <a:t>8</a:t>
+            </a:fld>
             <a:endParaRPr lang="en-US"/>
-          </a:p>
-        </p:txBody>
-      </p:sp>
-      <p:sp>
-        <p:nvSpPr>
-          <p:cNvPr id="29700" name="Rectangle 5"/>
-          <p:cNvSpPr>
-            <a:spLocks noChangeArrowheads="1"/>
-          </p:cNvSpPr>
-          <p:nvPr/>
-        </p:nvSpPr>
-        <p:spPr bwMode="auto">
-          <a:xfrm>
-            <a:off x="1019175" y="2262188"/>
-            <a:ext cx="7448550" cy="2436812"/>
-          </a:xfrm>
-          <a:prstGeom prst="rect">
-            <a:avLst/>
-          </a:prstGeom>
-          <a:solidFill>
-            <a:srgbClr val="CCFFCC"/>
-          </a:solidFill>
-          <a:ln w="9525">
-            <a:noFill/>
-            <a:miter lim="800000"/>
-            <a:headEnd/>
-            <a:tailEnd/>
-          </a:ln>
-        </p:spPr>
-        <p:txBody>
-          <a:bodyPr>
-            <a:spAutoFit/>
-          </a:bodyPr>
-          <a:lstStyle/>
-          <a:p>
-            <a:pPr marL="685800" indent="-685800"/>
-            <a:r>
-              <a:rPr lang="en-US" sz="2200">
-                <a:solidFill>
-                  <a:schemeClr val="bg2"/>
-                </a:solidFill>
-                <a:latin typeface="Courier New" pitchFamily="49" charset="0"/>
-              </a:rPr>
-              <a:t>ENVVAR</a:t>
-            </a:r>
-          </a:p>
-          <a:p>
-            <a:pPr marL="685800" indent="-685800"/>
-            <a:r>
-              <a:rPr lang="en-US" sz="2200">
-                <a:solidFill>
-                  <a:schemeClr val="bg2"/>
-                </a:solidFill>
-                <a:latin typeface="Courier New" pitchFamily="49" charset="0"/>
-              </a:rPr>
-              <a:t>NAME             VALUE</a:t>
-            </a:r>
-          </a:p>
-          <a:p>
-            <a:pPr marL="685800" indent="-685800"/>
-            <a:r>
-              <a:rPr lang="en-US" sz="2200">
-                <a:solidFill>
-                  <a:schemeClr val="bg2"/>
-                </a:solidFill>
-                <a:latin typeface="Courier New" pitchFamily="49" charset="0"/>
-              </a:rPr>
-              <a:t>DSM2INPUTDIR     ${DSM2_HOME}/common_input</a:t>
-            </a:r>
-          </a:p>
-          <a:p>
-            <a:pPr marL="685800" indent="-685800"/>
-            <a:r>
-              <a:rPr lang="en-US" sz="2200">
-                <a:solidFill>
-                  <a:schemeClr val="bg2"/>
-                </a:solidFill>
-                <a:latin typeface="Courier New" pitchFamily="49" charset="0"/>
-              </a:rPr>
-              <a:t>START_DATE       01JAN1990</a:t>
-            </a:r>
-          </a:p>
-          <a:p>
-            <a:pPr marL="685800" indent="-685800"/>
-            <a:r>
-              <a:rPr lang="en-US" sz="2200">
-                <a:solidFill>
-                  <a:schemeClr val="bg2"/>
-                </a:solidFill>
-                <a:latin typeface="Courier New" pitchFamily="49" charset="0"/>
-              </a:rPr>
-              <a:t>STUDYDIR         .</a:t>
-            </a:r>
-          </a:p>
-          <a:p>
-            <a:pPr marL="685800" indent="-685800"/>
-            <a:r>
-              <a:rPr lang="en-US" sz="2200">
-                <a:solidFill>
-                  <a:schemeClr val="bg2"/>
-                </a:solidFill>
-                <a:latin typeface="Courier New" pitchFamily="49" charset="0"/>
-              </a:rPr>
-              <a:t>OUTPUT           ${STUDYDIR}/output</a:t>
-            </a:r>
-          </a:p>
-          <a:p>
-            <a:pPr marL="685800" indent="-685800"/>
-            <a:r>
-              <a:rPr lang="en-US" sz="2200">
-                <a:solidFill>
-                  <a:schemeClr val="bg2"/>
-                </a:solidFill>
-                <a:latin typeface="Courier New" pitchFamily="49" charset="0"/>
-              </a:rPr>
-              <a:t>END</a:t>
-            </a:r>
-          </a:p>
-        </p:txBody>
-      </p:sp>
-      <p:sp>
-        <p:nvSpPr>
-          <p:cNvPr id="29701" name="Text Box 6"/>
-          <p:cNvSpPr txBox="1">
-            <a:spLocks noChangeArrowheads="1"/>
-          </p:cNvSpPr>
-          <p:nvPr/>
-        </p:nvSpPr>
-        <p:spPr bwMode="auto">
-          <a:xfrm>
-            <a:off x="5357813" y="5330825"/>
-            <a:ext cx="2927350" cy="427038"/>
-          </a:xfrm>
-          <a:prstGeom prst="rect">
-            <a:avLst/>
-          </a:prstGeom>
-          <a:solidFill>
-            <a:srgbClr val="CCFFCC"/>
-          </a:solidFill>
-          <a:ln w="9525" algn="ctr">
-            <a:noFill/>
-            <a:miter lim="800000"/>
-            <a:headEnd/>
-            <a:tailEnd/>
-          </a:ln>
-        </p:spPr>
-        <p:txBody>
-          <a:bodyPr>
-            <a:spAutoFit/>
-          </a:bodyPr>
-          <a:lstStyle/>
-          <a:p>
-            <a:pPr marL="685800" indent="-685800"/>
-            <a:r>
-              <a:rPr lang="en-US" sz="2200">
-                <a:solidFill>
-                  <a:schemeClr val="bg2"/>
-                </a:solidFill>
-                <a:latin typeface="Courier New" pitchFamily="49" charset="0"/>
-              </a:rPr>
-              <a:t>${DSM2INPUTDIR}</a:t>
-            </a:r>
           </a:p>
         </p:txBody>
       </p:sp>
@@ -7652,7 +8637,7 @@
       </p:grpSpPr>
       <p:sp>
         <p:nvSpPr>
-          <p:cNvPr id="31745" name="Rectangle 2"/>
+          <p:cNvPr id="29697" name="Rectangle 2"/>
           <p:cNvSpPr>
             <a:spLocks noGrp="1" noChangeArrowheads="1"/>
           </p:cNvSpPr>
@@ -7660,32 +8645,10 @@
             <p:ph type="title"/>
           </p:nvPr>
         </p:nvSpPr>
-        <p:spPr/>
-        <p:txBody>
-          <a:bodyPr/>
-          <a:lstStyle/>
-          <a:p>
-            <a:r>
-              <a:rPr lang="en-US" smtClean="0"/>
-              <a:t>Style</a:t>
-            </a:r>
-          </a:p>
-        </p:txBody>
-      </p:sp>
-      <p:sp>
-        <p:nvSpPr>
-          <p:cNvPr id="31746" name="Rectangle 3"/>
-          <p:cNvSpPr>
-            <a:spLocks noGrp="1" noChangeArrowheads="1"/>
-          </p:cNvSpPr>
-          <p:nvPr>
-            <p:ph type="body" idx="1"/>
-          </p:nvPr>
-        </p:nvSpPr>
         <p:spPr>
           <a:xfrm>
-            <a:off x="685800" y="1814513"/>
-            <a:ext cx="7772400" cy="4114800"/>
+            <a:off x="685800" y="323850"/>
+            <a:ext cx="7870825" cy="1143000"/>
           </a:xfrm>
         </p:spPr>
         <p:txBody>
@@ -7694,48 +8657,363 @@
           <a:p>
             <a:r>
               <a:rPr lang="en-US" smtClean="0"/>
-              <a:t>Use Upper Case:</a:t>
-            </a:r>
-          </a:p>
-          <a:p>
-            <a:pPr lvl="1"/>
-            <a:r>
-              <a:rPr lang="en-US" smtClean="0"/>
-              <a:t>Table/Include Block Names and Headers</a:t>
-            </a:r>
-          </a:p>
-          <a:p>
-            <a:pPr lvl="1"/>
-            <a:r>
-              <a:rPr lang="en-US" smtClean="0"/>
-              <a:t>ENVVAR substitution ${LIKE_THIS}</a:t>
-            </a:r>
-          </a:p>
-          <a:p>
-            <a:pPr lvl="1"/>
-            <a:r>
-              <a:rPr lang="en-US" smtClean="0"/>
-              <a:t>Constants in op rules</a:t>
-            </a:r>
-          </a:p>
-          <a:p>
-            <a:r>
-              <a:rPr lang="en-US" smtClean="0"/>
-              <a:t>Use lower_case everywhere else</a:t>
-            </a:r>
-          </a:p>
-          <a:p>
-            <a:r>
-              <a:rPr lang="en-US" smtClean="0"/>
-              <a:t>Set your text editor for spaces, not tabs</a:t>
-            </a:r>
-          </a:p>
-          <a:p>
-            <a:endParaRPr lang="en-US" smtClean="0"/>
-          </a:p>
-          <a:p>
-            <a:pPr lvl="1"/>
-            <a:endParaRPr lang="en-US" smtClean="0"/>
+              <a:t>ENVVAR: Text Substitution</a:t>
+            </a:r>
+          </a:p>
+        </p:txBody>
+      </p:sp>
+      <p:sp>
+        <p:nvSpPr>
+          <p:cNvPr id="29698" name="Rectangle 3"/>
+          <p:cNvSpPr>
+            <a:spLocks noGrp="1" noChangeArrowheads="1"/>
+          </p:cNvSpPr>
+          <p:nvPr>
+            <p:ph type="body" idx="1"/>
+          </p:nvPr>
+        </p:nvSpPr>
+        <p:spPr>
+          <a:xfrm>
+            <a:off x="300038" y="1362075"/>
+            <a:ext cx="8664575" cy="5059363"/>
+          </a:xfrm>
+        </p:spPr>
+        <p:txBody>
+          <a:bodyPr/>
+          <a:lstStyle/>
+          <a:p>
+            <a:pPr>
+              <a:lnSpc>
+                <a:spcPct val="80000"/>
+              </a:lnSpc>
+            </a:pPr>
+            <a:r>
+              <a:rPr lang="en-US" sz="2600" smtClean="0"/>
+              <a:t>Used for flexibility…avoids multiple files and erasing</a:t>
+            </a:r>
+          </a:p>
+          <a:p>
+            <a:pPr>
+              <a:lnSpc>
+                <a:spcPct val="80000"/>
+              </a:lnSpc>
+            </a:pPr>
+            <a:r>
+              <a:rPr lang="en-US" sz="2600" smtClean="0"/>
+              <a:t>Define in ENVVAR table (or OS environment):</a:t>
+            </a:r>
+          </a:p>
+          <a:p>
+            <a:pPr>
+              <a:lnSpc>
+                <a:spcPct val="80000"/>
+              </a:lnSpc>
+            </a:pPr>
+            <a:endParaRPr lang="en-US" sz="2600" smtClean="0"/>
+          </a:p>
+          <a:p>
+            <a:pPr>
+              <a:lnSpc>
+                <a:spcPct val="80000"/>
+              </a:lnSpc>
+            </a:pPr>
+            <a:endParaRPr lang="en-US" sz="2600" smtClean="0"/>
+          </a:p>
+          <a:p>
+            <a:pPr>
+              <a:lnSpc>
+                <a:spcPct val="80000"/>
+              </a:lnSpc>
+            </a:pPr>
+            <a:endParaRPr lang="en-US" sz="2600" smtClean="0"/>
+          </a:p>
+          <a:p>
+            <a:pPr>
+              <a:lnSpc>
+                <a:spcPct val="80000"/>
+              </a:lnSpc>
+            </a:pPr>
+            <a:endParaRPr lang="en-US" sz="2600" smtClean="0"/>
+          </a:p>
+          <a:p>
+            <a:pPr>
+              <a:lnSpc>
+                <a:spcPct val="80000"/>
+              </a:lnSpc>
+            </a:pPr>
+            <a:endParaRPr lang="en-US" sz="2600" smtClean="0"/>
+          </a:p>
+          <a:p>
+            <a:pPr>
+              <a:lnSpc>
+                <a:spcPct val="80000"/>
+              </a:lnSpc>
+            </a:pPr>
+            <a:endParaRPr lang="en-US" sz="2600" smtClean="0"/>
+          </a:p>
+          <a:p>
+            <a:pPr>
+              <a:lnSpc>
+                <a:spcPct val="80000"/>
+              </a:lnSpc>
+            </a:pPr>
+            <a:endParaRPr lang="en-US" sz="2600" smtClean="0"/>
+          </a:p>
+          <a:p>
+            <a:pPr>
+              <a:lnSpc>
+                <a:spcPct val="80000"/>
+              </a:lnSpc>
+            </a:pPr>
+            <a:r>
+              <a:rPr lang="en-US" sz="2600" smtClean="0"/>
+              <a:t>Subject to layering</a:t>
+            </a:r>
+          </a:p>
+          <a:p>
+            <a:pPr>
+              <a:lnSpc>
+                <a:spcPct val="80000"/>
+              </a:lnSpc>
+            </a:pPr>
+            <a:r>
+              <a:rPr lang="en-US" sz="2600" smtClean="0"/>
+              <a:t>Use anywhere else using ${ }:   </a:t>
+            </a:r>
+          </a:p>
+          <a:p>
+            <a:pPr>
+              <a:lnSpc>
+                <a:spcPct val="80000"/>
+              </a:lnSpc>
+            </a:pPr>
+            <a:r>
+              <a:rPr lang="en-US" sz="2600" smtClean="0"/>
+              <a:t>Nesting and interdependency allowed.</a:t>
+            </a:r>
+          </a:p>
+          <a:p>
+            <a:pPr>
+              <a:lnSpc>
+                <a:spcPct val="80000"/>
+              </a:lnSpc>
+            </a:pPr>
+            <a:endParaRPr lang="en-US" sz="2600" smtClean="0"/>
+          </a:p>
+          <a:p>
+            <a:pPr>
+              <a:lnSpc>
+                <a:spcPct val="80000"/>
+              </a:lnSpc>
+            </a:pPr>
+            <a:endParaRPr lang="en-US" sz="2600" smtClean="0"/>
+          </a:p>
+          <a:p>
+            <a:pPr>
+              <a:lnSpc>
+                <a:spcPct val="80000"/>
+              </a:lnSpc>
+              <a:buFontTx/>
+              <a:buNone/>
+            </a:pPr>
+            <a:endParaRPr lang="en-US" sz="2400" smtClean="0"/>
+          </a:p>
+        </p:txBody>
+      </p:sp>
+      <p:sp>
+        <p:nvSpPr>
+          <p:cNvPr id="29699" name="Rectangle 4"/>
+          <p:cNvSpPr>
+            <a:spLocks noChangeArrowheads="1"/>
+          </p:cNvSpPr>
+          <p:nvPr/>
+        </p:nvSpPr>
+        <p:spPr bwMode="auto">
+          <a:xfrm>
+            <a:off x="1455738" y="2981325"/>
+            <a:ext cx="4572000" cy="641350"/>
+          </a:xfrm>
+          <a:prstGeom prst="rect">
+            <a:avLst/>
+          </a:prstGeom>
+          <a:noFill/>
+          <a:ln w="9525">
+            <a:noFill/>
+            <a:miter lim="800000"/>
+            <a:headEnd/>
+            <a:tailEnd/>
+          </a:ln>
+        </p:spPr>
+        <p:txBody>
+          <a:bodyPr>
+            <a:spAutoFit/>
+          </a:bodyPr>
+          <a:lstStyle/>
+          <a:p>
+            <a:pPr marL="685800" indent="-685800"/>
+            <a:endParaRPr lang="en-US"/>
+          </a:p>
+        </p:txBody>
+      </p:sp>
+      <p:sp>
+        <p:nvSpPr>
+          <p:cNvPr id="29700" name="Rectangle 5"/>
+          <p:cNvSpPr>
+            <a:spLocks noChangeArrowheads="1"/>
+          </p:cNvSpPr>
+          <p:nvPr/>
+        </p:nvSpPr>
+        <p:spPr bwMode="auto">
+          <a:xfrm>
+            <a:off x="1019175" y="2262188"/>
+            <a:ext cx="7448550" cy="2436812"/>
+          </a:xfrm>
+          <a:prstGeom prst="rect">
+            <a:avLst/>
+          </a:prstGeom>
+          <a:solidFill>
+            <a:srgbClr val="CCFFCC"/>
+          </a:solidFill>
+          <a:ln w="9525">
+            <a:noFill/>
+            <a:miter lim="800000"/>
+            <a:headEnd/>
+            <a:tailEnd/>
+          </a:ln>
+        </p:spPr>
+        <p:txBody>
+          <a:bodyPr>
+            <a:spAutoFit/>
+          </a:bodyPr>
+          <a:lstStyle/>
+          <a:p>
+            <a:pPr marL="685800" indent="-685800"/>
+            <a:r>
+              <a:rPr lang="en-US" sz="2200">
+                <a:solidFill>
+                  <a:schemeClr val="bg2"/>
+                </a:solidFill>
+                <a:latin typeface="Courier New" pitchFamily="49" charset="0"/>
+              </a:rPr>
+              <a:t>ENVVAR</a:t>
+            </a:r>
+          </a:p>
+          <a:p>
+            <a:pPr marL="685800" indent="-685800"/>
+            <a:r>
+              <a:rPr lang="en-US" sz="2200">
+                <a:solidFill>
+                  <a:schemeClr val="bg2"/>
+                </a:solidFill>
+                <a:latin typeface="Courier New" pitchFamily="49" charset="0"/>
+              </a:rPr>
+              <a:t>NAME             VALUE</a:t>
+            </a:r>
+          </a:p>
+          <a:p>
+            <a:pPr marL="685800" indent="-685800"/>
+            <a:r>
+              <a:rPr lang="en-US" sz="2200">
+                <a:solidFill>
+                  <a:schemeClr val="bg2"/>
+                </a:solidFill>
+                <a:latin typeface="Courier New" pitchFamily="49" charset="0"/>
+              </a:rPr>
+              <a:t>DSM2INPUTDIR     ${DSM2_HOME}/common_input</a:t>
+            </a:r>
+          </a:p>
+          <a:p>
+            <a:pPr marL="685800" indent="-685800"/>
+            <a:r>
+              <a:rPr lang="en-US" sz="2200">
+                <a:solidFill>
+                  <a:schemeClr val="bg2"/>
+                </a:solidFill>
+                <a:latin typeface="Courier New" pitchFamily="49" charset="0"/>
+              </a:rPr>
+              <a:t>START_DATE       01JAN1990</a:t>
+            </a:r>
+          </a:p>
+          <a:p>
+            <a:pPr marL="685800" indent="-685800"/>
+            <a:r>
+              <a:rPr lang="en-US" sz="2200">
+                <a:solidFill>
+                  <a:schemeClr val="bg2"/>
+                </a:solidFill>
+                <a:latin typeface="Courier New" pitchFamily="49" charset="0"/>
+              </a:rPr>
+              <a:t>STUDYDIR         .</a:t>
+            </a:r>
+          </a:p>
+          <a:p>
+            <a:pPr marL="685800" indent="-685800"/>
+            <a:r>
+              <a:rPr lang="en-US" sz="2200">
+                <a:solidFill>
+                  <a:schemeClr val="bg2"/>
+                </a:solidFill>
+                <a:latin typeface="Courier New" pitchFamily="49" charset="0"/>
+              </a:rPr>
+              <a:t>OUTPUT           ${STUDYDIR}/output</a:t>
+            </a:r>
+          </a:p>
+          <a:p>
+            <a:pPr marL="685800" indent="-685800"/>
+            <a:r>
+              <a:rPr lang="en-US" sz="2200">
+                <a:solidFill>
+                  <a:schemeClr val="bg2"/>
+                </a:solidFill>
+                <a:latin typeface="Courier New" pitchFamily="49" charset="0"/>
+              </a:rPr>
+              <a:t>END</a:t>
+            </a:r>
+          </a:p>
+        </p:txBody>
+      </p:sp>
+      <p:sp>
+        <p:nvSpPr>
+          <p:cNvPr id="29701" name="Text Box 6"/>
+          <p:cNvSpPr txBox="1">
+            <a:spLocks noChangeArrowheads="1"/>
+          </p:cNvSpPr>
+          <p:nvPr/>
+        </p:nvSpPr>
+        <p:spPr bwMode="auto">
+          <a:xfrm>
+            <a:off x="5357813" y="5330825"/>
+            <a:ext cx="2927350" cy="427038"/>
+          </a:xfrm>
+          <a:prstGeom prst="rect">
+            <a:avLst/>
+          </a:prstGeom>
+          <a:solidFill>
+            <a:srgbClr val="CCFFCC"/>
+          </a:solidFill>
+          <a:ln w="9525" algn="ctr">
+            <a:noFill/>
+            <a:miter lim="800000"/>
+            <a:headEnd/>
+            <a:tailEnd/>
+          </a:ln>
+        </p:spPr>
+        <p:txBody>
+          <a:bodyPr>
+            <a:spAutoFit/>
+          </a:bodyPr>
+          <a:lstStyle/>
+          <a:p>
+            <a:pPr marL="685800" indent="-685800"/>
+            <a:r>
+              <a:rPr lang="en-US" sz="2200">
+                <a:solidFill>
+                  <a:schemeClr val="bg2"/>
+                </a:solidFill>
+                <a:latin typeface="Courier New" pitchFamily="49" charset="0"/>
+              </a:rPr>
+              <a:t>${DSM2INPUTDIR}</a:t>
+            </a:r>
           </a:p>
         </p:txBody>
       </p:sp>

</xml_diff>